<commit_message>
update stanley algorithm description
</commit_message>
<xml_diff>
--- a/RQ factorization and path generation.pptx
+++ b/RQ factorization and path generation.pptx
@@ -309,7 +309,7 @@
                 <a:tabLst/>
                 <a:defRPr/>
               </a:pPr>
-              <a:t>2023/8/9</a:t>
+              <a:t>2023/8/16</a:t>
             </a:fld>
             <a:endParaRPr kumimoji="0" lang="zh-CN" altLang="en-US" sz="1200" b="0" i="0" u="none" strike="noStrike" kern="1200" cap="none" spc="0" normalizeH="0" baseline="0" noProof="0">
               <a:ln>
@@ -639,7 +639,7 @@
                 <a:tabLst/>
                 <a:defRPr/>
               </a:pPr>
-              <a:t>2023/8/9</a:t>
+              <a:t>2023/8/16</a:t>
             </a:fld>
             <a:endParaRPr kumimoji="0" lang="zh-CN" altLang="en-US" sz="1200" b="0" i="0" u="none" strike="noStrike" kern="1200" cap="none" spc="0" normalizeH="0" baseline="0" noProof="0">
               <a:ln>
@@ -979,7 +979,7 @@
                 <a:tabLst/>
                 <a:defRPr/>
               </a:pPr>
-              <a:t>2023/8/9</a:t>
+              <a:t>2023/8/16</a:t>
             </a:fld>
             <a:endParaRPr kumimoji="0" lang="zh-CN" altLang="en-US" sz="1200" b="0" i="0" u="none" strike="noStrike" kern="1200" cap="none" spc="0" normalizeH="0" baseline="0" noProof="0">
               <a:ln>
@@ -1309,7 +1309,7 @@
                 <a:tabLst/>
                 <a:defRPr/>
               </a:pPr>
-              <a:t>2023/8/9</a:t>
+              <a:t>2023/8/16</a:t>
             </a:fld>
             <a:endParaRPr kumimoji="0" lang="zh-CN" altLang="en-US" sz="1200" b="0" i="0" u="none" strike="noStrike" kern="1200" cap="none" spc="0" normalizeH="0" baseline="0" noProof="0">
               <a:ln>
@@ -1715,7 +1715,7 @@
                 <a:tabLst/>
                 <a:defRPr/>
               </a:pPr>
-              <a:t>2023/8/9</a:t>
+              <a:t>2023/8/16</a:t>
             </a:fld>
             <a:endParaRPr kumimoji="0" lang="zh-CN" altLang="en-US" sz="1200" b="0" i="0" u="none" strike="noStrike" kern="1200" cap="none" spc="0" normalizeH="0" baseline="0" noProof="0">
               <a:ln>
@@ -2107,7 +2107,7 @@
                 <a:tabLst/>
                 <a:defRPr/>
               </a:pPr>
-              <a:t>2023/8/9</a:t>
+              <a:t>2023/8/16</a:t>
             </a:fld>
             <a:endParaRPr kumimoji="0" lang="zh-CN" altLang="en-US" sz="1200" b="0" i="0" u="none" strike="noStrike" kern="1200" cap="none" spc="0" normalizeH="0" baseline="0" noProof="0">
               <a:ln>
@@ -2634,7 +2634,7 @@
                 <a:tabLst/>
                 <a:defRPr/>
               </a:pPr>
-              <a:t>2023/8/9</a:t>
+              <a:t>2023/8/16</a:t>
             </a:fld>
             <a:endParaRPr kumimoji="0" lang="zh-CN" altLang="en-US" sz="1200" b="0" i="0" u="none" strike="noStrike" kern="1200" cap="none" spc="0" normalizeH="0" baseline="0" noProof="0">
               <a:ln>
@@ -2912,7 +2912,7 @@
                 <a:tabLst/>
                 <a:defRPr/>
               </a:pPr>
-              <a:t>2023/8/9</a:t>
+              <a:t>2023/8/16</a:t>
             </a:fld>
             <a:endParaRPr kumimoji="0" lang="zh-CN" altLang="en-US" sz="1200" b="0" i="0" u="none" strike="noStrike" kern="1200" cap="none" spc="0" normalizeH="0" baseline="0" noProof="0">
               <a:ln>
@@ -3167,7 +3167,7 @@
                 <a:tabLst/>
                 <a:defRPr/>
               </a:pPr>
-              <a:t>2023/8/9</a:t>
+              <a:t>2023/8/16</a:t>
             </a:fld>
             <a:endParaRPr kumimoji="0" lang="zh-CN" altLang="en-US" sz="1200" b="0" i="0" u="none" strike="noStrike" kern="1200" cap="none" spc="0" normalizeH="0" baseline="0" noProof="0">
               <a:ln>
@@ -3604,7 +3604,7 @@
                 <a:tabLst/>
                 <a:defRPr/>
               </a:pPr>
-              <a:t>2023/8/9</a:t>
+              <a:t>2023/8/16</a:t>
             </a:fld>
             <a:endParaRPr kumimoji="0" lang="zh-CN" altLang="en-US" sz="1200" b="0" i="0" u="none" strike="noStrike" kern="1200" cap="none" spc="0" normalizeH="0" baseline="0" noProof="0">
               <a:ln>
@@ -4017,7 +4017,7 @@
                 <a:tabLst/>
                 <a:defRPr/>
               </a:pPr>
-              <a:t>2023/8/9</a:t>
+              <a:t>2023/8/16</a:t>
             </a:fld>
             <a:endParaRPr kumimoji="0" lang="zh-CN" altLang="en-US" sz="1200" b="0" i="0" u="none" strike="noStrike" kern="1200" cap="none" spc="0" normalizeH="0" baseline="0" noProof="0">
               <a:ln>
@@ -4390,7 +4390,7 @@
                 <a:tabLst/>
                 <a:defRPr/>
               </a:pPr>
-              <a:t>2023/8/9</a:t>
+              <a:t>2023/8/16</a:t>
             </a:fld>
             <a:endParaRPr kumimoji="0" lang="zh-CN" altLang="en-US" sz="1200" b="0" i="0" u="none" strike="noStrike" kern="1200" cap="none" spc="0" normalizeH="0" baseline="0" noProof="0">
               <a:ln>
@@ -5519,8 +5519,17 @@
           <a:p>
             <a:r>
               <a:rPr lang="en-US" altLang="zh-CN" sz="1400" dirty="0" smtClean="0"/>
-              <a:t>P4 = sf</a:t>
-            </a:r>
+              <a:t>P4 = </a:t>
+            </a:r>
+            <a:r>
+              <a:rPr lang="en-US" altLang="zh-CN" sz="1400" dirty="0" smtClean="0"/>
+              <a:t>sf</a:t>
+            </a:r>
+            <a:r>
+              <a:rPr lang="zh-CN" altLang="en-US" sz="1400" dirty="0" smtClean="0"/>
+              <a:t>（最终的弧长）</a:t>
+            </a:r>
+            <a:endParaRPr lang="en-US" altLang="zh-CN" sz="1400" dirty="0" smtClean="0"/>
           </a:p>
           <a:p>
             <a:r>

</xml_diff>